<commit_message>
Atualização do módulo 4
</commit_message>
<xml_diff>
--- a/aulas/modulo4/Módulo 4 - Webservices.pptx
+++ b/aulas/modulo4/Módulo 4 - Webservices.pptx
@@ -353,7 +353,7 @@
             <a:fld id="{B61BEF0D-F0BB-DE4B-95CE-6DB70DBA9567}" type="datetimeFigureOut">
               <a:rPr lang="en-US" dirty="0"/>
               <a:pPr/>
-              <a:t>5/29/2017</a:t>
+              <a:t>5/30/2017</a:t>
             </a:fld>
             <a:endParaRPr lang="en-US" dirty="0"/>
           </a:p>
@@ -684,7 +684,7 @@
             <a:fld id="{B61BEF0D-F0BB-DE4B-95CE-6DB70DBA9567}" type="datetimeFigureOut">
               <a:rPr lang="en-US" dirty="0"/>
               <a:pPr/>
-              <a:t>5/29/2017</a:t>
+              <a:t>5/30/2017</a:t>
             </a:fld>
             <a:endParaRPr lang="en-US" dirty="0"/>
           </a:p>
@@ -959,7 +959,7 @@
             <a:fld id="{B61BEF0D-F0BB-DE4B-95CE-6DB70DBA9567}" type="datetimeFigureOut">
               <a:rPr lang="en-US" dirty="0"/>
               <a:pPr/>
-              <a:t>5/29/2017</a:t>
+              <a:t>5/30/2017</a:t>
             </a:fld>
             <a:endParaRPr lang="en-US" dirty="0"/>
           </a:p>
@@ -1524,7 +1524,7 @@
             <a:fld id="{B61BEF0D-F0BB-DE4B-95CE-6DB70DBA9567}" type="datetimeFigureOut">
               <a:rPr lang="en-US" dirty="0"/>
               <a:pPr/>
-              <a:t>5/29/2017</a:t>
+              <a:t>5/30/2017</a:t>
             </a:fld>
             <a:endParaRPr lang="en-US" dirty="0"/>
           </a:p>
@@ -1799,7 +1799,7 @@
             <a:fld id="{B61BEF0D-F0BB-DE4B-95CE-6DB70DBA9567}" type="datetimeFigureOut">
               <a:rPr lang="en-US" dirty="0"/>
               <a:pPr/>
-              <a:t>5/29/2017</a:t>
+              <a:t>5/30/2017</a:t>
             </a:fld>
             <a:endParaRPr lang="en-US" dirty="0"/>
           </a:p>
@@ -2358,7 +2358,7 @@
             <a:fld id="{B61BEF0D-F0BB-DE4B-95CE-6DB70DBA9567}" type="datetimeFigureOut">
               <a:rPr lang="en-US" dirty="0"/>
               <a:pPr/>
-              <a:t>5/29/2017</a:t>
+              <a:t>5/30/2017</a:t>
             </a:fld>
             <a:endParaRPr lang="en-US" dirty="0"/>
           </a:p>
@@ -2682,7 +2682,7 @@
             <a:fld id="{B61BEF0D-F0BB-DE4B-95CE-6DB70DBA9567}" type="datetimeFigureOut">
               <a:rPr lang="en-US" dirty="0"/>
               <a:pPr/>
-              <a:t>5/29/2017</a:t>
+              <a:t>5/30/2017</a:t>
             </a:fld>
             <a:endParaRPr lang="en-US" dirty="0"/>
           </a:p>
@@ -2884,7 +2884,7 @@
             <a:fld id="{B61BEF0D-F0BB-DE4B-95CE-6DB70DBA9567}" type="datetimeFigureOut">
               <a:rPr lang="en-US" dirty="0"/>
               <a:pPr/>
-              <a:t>5/29/2017</a:t>
+              <a:t>5/30/2017</a:t>
             </a:fld>
             <a:endParaRPr lang="en-US" dirty="0"/>
           </a:p>
@@ -3091,7 +3091,7 @@
             <a:fld id="{B61BEF0D-F0BB-DE4B-95CE-6DB70DBA9567}" type="datetimeFigureOut">
               <a:rPr lang="en-US" dirty="0"/>
               <a:pPr/>
-              <a:t>5/29/2017</a:t>
+              <a:t>5/30/2017</a:t>
             </a:fld>
             <a:endParaRPr lang="en-US" dirty="0"/>
           </a:p>
@@ -3288,7 +3288,7 @@
             <a:fld id="{B61BEF0D-F0BB-DE4B-95CE-6DB70DBA9567}" type="datetimeFigureOut">
               <a:rPr lang="en-US" dirty="0"/>
               <a:pPr/>
-              <a:t>5/29/2017</a:t>
+              <a:t>5/30/2017</a:t>
             </a:fld>
             <a:endParaRPr lang="en-US" dirty="0"/>
           </a:p>
@@ -3561,7 +3561,7 @@
             <a:fld id="{B61BEF0D-F0BB-DE4B-95CE-6DB70DBA9567}" type="datetimeFigureOut">
               <a:rPr lang="en-US" dirty="0"/>
               <a:pPr/>
-              <a:t>5/29/2017</a:t>
+              <a:t>5/30/2017</a:t>
             </a:fld>
             <a:endParaRPr lang="en-US" dirty="0"/>
           </a:p>
@@ -3824,7 +3824,7 @@
             <a:fld id="{B61BEF0D-F0BB-DE4B-95CE-6DB70DBA9567}" type="datetimeFigureOut">
               <a:rPr lang="en-US" dirty="0"/>
               <a:pPr/>
-              <a:t>5/29/2017</a:t>
+              <a:t>5/30/2017</a:t>
             </a:fld>
             <a:endParaRPr lang="en-US" dirty="0"/>
           </a:p>
@@ -4195,7 +4195,7 @@
             <a:fld id="{B61BEF0D-F0BB-DE4B-95CE-6DB70DBA9567}" type="datetimeFigureOut">
               <a:rPr lang="en-US" dirty="0"/>
               <a:pPr/>
-              <a:t>5/29/2017</a:t>
+              <a:t>5/30/2017</a:t>
             </a:fld>
             <a:endParaRPr lang="en-US" dirty="0"/>
           </a:p>
@@ -4340,7 +4340,7 @@
             <a:fld id="{B61BEF0D-F0BB-DE4B-95CE-6DB70DBA9567}" type="datetimeFigureOut">
               <a:rPr lang="en-US" dirty="0"/>
               <a:pPr/>
-              <a:t>5/29/2017</a:t>
+              <a:t>5/30/2017</a:t>
             </a:fld>
             <a:endParaRPr lang="en-US" dirty="0"/>
           </a:p>
@@ -4462,7 +4462,7 @@
             <a:fld id="{B61BEF0D-F0BB-DE4B-95CE-6DB70DBA9567}" type="datetimeFigureOut">
               <a:rPr lang="en-US" dirty="0"/>
               <a:pPr/>
-              <a:t>5/29/2017</a:t>
+              <a:t>5/30/2017</a:t>
             </a:fld>
             <a:endParaRPr lang="en-US" dirty="0"/>
           </a:p>
@@ -4744,7 +4744,7 @@
             <a:fld id="{B61BEF0D-F0BB-DE4B-95CE-6DB70DBA9567}" type="datetimeFigureOut">
               <a:rPr lang="en-US" dirty="0"/>
               <a:pPr/>
-              <a:t>5/29/2017</a:t>
+              <a:t>5/30/2017</a:t>
             </a:fld>
             <a:endParaRPr lang="en-US" dirty="0"/>
           </a:p>
@@ -5065,7 +5065,7 @@
             <a:fld id="{B61BEF0D-F0BB-DE4B-95CE-6DB70DBA9567}" type="datetimeFigureOut">
               <a:rPr lang="en-US" dirty="0"/>
               <a:pPr/>
-              <a:t>5/29/2017</a:t>
+              <a:t>5/30/2017</a:t>
             </a:fld>
             <a:endParaRPr lang="en-US" dirty="0"/>
           </a:p>
@@ -5276,7 +5276,7 @@
             <a:fld id="{B61BEF0D-F0BB-DE4B-95CE-6DB70DBA9567}" type="datetimeFigureOut">
               <a:rPr lang="en-US" dirty="0"/>
               <a:pPr/>
-              <a:t>5/29/2017</a:t>
+              <a:t>5/30/2017</a:t>
             </a:fld>
             <a:endParaRPr lang="en-US" dirty="0"/>
           </a:p>

</xml_diff>

<commit_message>
Atualizacao das aulas e tutoriais
</commit_message>
<xml_diff>
--- a/aulas/modulo4/Módulo 4 - Webservices.pptx
+++ b/aulas/modulo4/Módulo 4 - Webservices.pptx
@@ -355,7 +355,7 @@
             <a:fld id="{B61BEF0D-F0BB-DE4B-95CE-6DB70DBA9567}" type="datetimeFigureOut">
               <a:rPr lang="en-US" dirty="0"/>
               <a:pPr/>
-              <a:t>5/30/2017</a:t>
+              <a:t>6/1/2017</a:t>
             </a:fld>
             <a:endParaRPr lang="en-US" dirty="0"/>
           </a:p>
@@ -686,7 +686,7 @@
             <a:fld id="{B61BEF0D-F0BB-DE4B-95CE-6DB70DBA9567}" type="datetimeFigureOut">
               <a:rPr lang="en-US" dirty="0"/>
               <a:pPr/>
-              <a:t>5/30/2017</a:t>
+              <a:t>6/1/2017</a:t>
             </a:fld>
             <a:endParaRPr lang="en-US" dirty="0"/>
           </a:p>
@@ -961,7 +961,7 @@
             <a:fld id="{B61BEF0D-F0BB-DE4B-95CE-6DB70DBA9567}" type="datetimeFigureOut">
               <a:rPr lang="en-US" dirty="0"/>
               <a:pPr/>
-              <a:t>5/30/2017</a:t>
+              <a:t>6/1/2017</a:t>
             </a:fld>
             <a:endParaRPr lang="en-US" dirty="0"/>
           </a:p>
@@ -1526,7 +1526,7 @@
             <a:fld id="{B61BEF0D-F0BB-DE4B-95CE-6DB70DBA9567}" type="datetimeFigureOut">
               <a:rPr lang="en-US" dirty="0"/>
               <a:pPr/>
-              <a:t>5/30/2017</a:t>
+              <a:t>6/1/2017</a:t>
             </a:fld>
             <a:endParaRPr lang="en-US" dirty="0"/>
           </a:p>
@@ -1801,7 +1801,7 @@
             <a:fld id="{B61BEF0D-F0BB-DE4B-95CE-6DB70DBA9567}" type="datetimeFigureOut">
               <a:rPr lang="en-US" dirty="0"/>
               <a:pPr/>
-              <a:t>5/30/2017</a:t>
+              <a:t>6/1/2017</a:t>
             </a:fld>
             <a:endParaRPr lang="en-US" dirty="0"/>
           </a:p>
@@ -2360,7 +2360,7 @@
             <a:fld id="{B61BEF0D-F0BB-DE4B-95CE-6DB70DBA9567}" type="datetimeFigureOut">
               <a:rPr lang="en-US" dirty="0"/>
               <a:pPr/>
-              <a:t>5/30/2017</a:t>
+              <a:t>6/1/2017</a:t>
             </a:fld>
             <a:endParaRPr lang="en-US" dirty="0"/>
           </a:p>
@@ -2684,7 +2684,7 @@
             <a:fld id="{B61BEF0D-F0BB-DE4B-95CE-6DB70DBA9567}" type="datetimeFigureOut">
               <a:rPr lang="en-US" dirty="0"/>
               <a:pPr/>
-              <a:t>5/30/2017</a:t>
+              <a:t>6/1/2017</a:t>
             </a:fld>
             <a:endParaRPr lang="en-US" dirty="0"/>
           </a:p>
@@ -2886,7 +2886,7 @@
             <a:fld id="{B61BEF0D-F0BB-DE4B-95CE-6DB70DBA9567}" type="datetimeFigureOut">
               <a:rPr lang="en-US" dirty="0"/>
               <a:pPr/>
-              <a:t>5/30/2017</a:t>
+              <a:t>6/1/2017</a:t>
             </a:fld>
             <a:endParaRPr lang="en-US" dirty="0"/>
           </a:p>
@@ -3093,7 +3093,7 @@
             <a:fld id="{B61BEF0D-F0BB-DE4B-95CE-6DB70DBA9567}" type="datetimeFigureOut">
               <a:rPr lang="en-US" dirty="0"/>
               <a:pPr/>
-              <a:t>5/30/2017</a:t>
+              <a:t>6/1/2017</a:t>
             </a:fld>
             <a:endParaRPr lang="en-US" dirty="0"/>
           </a:p>
@@ -3290,7 +3290,7 @@
             <a:fld id="{B61BEF0D-F0BB-DE4B-95CE-6DB70DBA9567}" type="datetimeFigureOut">
               <a:rPr lang="en-US" dirty="0"/>
               <a:pPr/>
-              <a:t>5/30/2017</a:t>
+              <a:t>6/1/2017</a:t>
             </a:fld>
             <a:endParaRPr lang="en-US" dirty="0"/>
           </a:p>
@@ -3563,7 +3563,7 @@
             <a:fld id="{B61BEF0D-F0BB-DE4B-95CE-6DB70DBA9567}" type="datetimeFigureOut">
               <a:rPr lang="en-US" dirty="0"/>
               <a:pPr/>
-              <a:t>5/30/2017</a:t>
+              <a:t>6/1/2017</a:t>
             </a:fld>
             <a:endParaRPr lang="en-US" dirty="0"/>
           </a:p>
@@ -3826,7 +3826,7 @@
             <a:fld id="{B61BEF0D-F0BB-DE4B-95CE-6DB70DBA9567}" type="datetimeFigureOut">
               <a:rPr lang="en-US" dirty="0"/>
               <a:pPr/>
-              <a:t>5/30/2017</a:t>
+              <a:t>6/1/2017</a:t>
             </a:fld>
             <a:endParaRPr lang="en-US" dirty="0"/>
           </a:p>
@@ -4197,7 +4197,7 @@
             <a:fld id="{B61BEF0D-F0BB-DE4B-95CE-6DB70DBA9567}" type="datetimeFigureOut">
               <a:rPr lang="en-US" dirty="0"/>
               <a:pPr/>
-              <a:t>5/30/2017</a:t>
+              <a:t>6/1/2017</a:t>
             </a:fld>
             <a:endParaRPr lang="en-US" dirty="0"/>
           </a:p>
@@ -4342,7 +4342,7 @@
             <a:fld id="{B61BEF0D-F0BB-DE4B-95CE-6DB70DBA9567}" type="datetimeFigureOut">
               <a:rPr lang="en-US" dirty="0"/>
               <a:pPr/>
-              <a:t>5/30/2017</a:t>
+              <a:t>6/1/2017</a:t>
             </a:fld>
             <a:endParaRPr lang="en-US" dirty="0"/>
           </a:p>
@@ -4464,7 +4464,7 @@
             <a:fld id="{B61BEF0D-F0BB-DE4B-95CE-6DB70DBA9567}" type="datetimeFigureOut">
               <a:rPr lang="en-US" dirty="0"/>
               <a:pPr/>
-              <a:t>5/30/2017</a:t>
+              <a:t>6/1/2017</a:t>
             </a:fld>
             <a:endParaRPr lang="en-US" dirty="0"/>
           </a:p>
@@ -4746,7 +4746,7 @@
             <a:fld id="{B61BEF0D-F0BB-DE4B-95CE-6DB70DBA9567}" type="datetimeFigureOut">
               <a:rPr lang="en-US" dirty="0"/>
               <a:pPr/>
-              <a:t>5/30/2017</a:t>
+              <a:t>6/1/2017</a:t>
             </a:fld>
             <a:endParaRPr lang="en-US" dirty="0"/>
           </a:p>
@@ -5067,7 +5067,7 @@
             <a:fld id="{B61BEF0D-F0BB-DE4B-95CE-6DB70DBA9567}" type="datetimeFigureOut">
               <a:rPr lang="en-US" dirty="0"/>
               <a:pPr/>
-              <a:t>5/30/2017</a:t>
+              <a:t>6/1/2017</a:t>
             </a:fld>
             <a:endParaRPr lang="en-US" dirty="0"/>
           </a:p>
@@ -5278,7 +5278,7 @@
             <a:fld id="{B61BEF0D-F0BB-DE4B-95CE-6DB70DBA9567}" type="datetimeFigureOut">
               <a:rPr lang="en-US" dirty="0"/>
               <a:pPr/>
-              <a:t>5/30/2017</a:t>
+              <a:t>6/1/2017</a:t>
             </a:fld>
             <a:endParaRPr lang="en-US" dirty="0"/>
           </a:p>

</xml_diff>